<commit_message>
bx bài tập chia cụm
</commit_message>
<xml_diff>
--- a/Bai 19 Chia cum van ban_p2.pptx
+++ b/Bai 19 Chia cum van ban_p2.pptx
@@ -5,7 +5,7 @@
     <p:sldMasterId id="2147483652" r:id="rId1"/>
   </p:sldMasterIdLst>
   <p:notesMasterIdLst>
-    <p:notesMasterId r:id="rId22"/>
+    <p:notesMasterId r:id="rId24"/>
   </p:notesMasterIdLst>
   <p:sldIdLst>
     <p:sldId id="313" r:id="rId2"/>
@@ -27,7 +27,9 @@
     <p:sldId id="574" r:id="rId18"/>
     <p:sldId id="575" r:id="rId19"/>
     <p:sldId id="576" r:id="rId20"/>
-    <p:sldId id="418" r:id="rId21"/>
+    <p:sldId id="577" r:id="rId21"/>
+    <p:sldId id="578" r:id="rId22"/>
+    <p:sldId id="418" r:id="rId23"/>
   </p:sldIdLst>
   <p:sldSz cx="9144000" cy="6858000" type="screen4x3"/>
   <p:notesSz cx="6858000" cy="9144000"/>
@@ -158,7 +160,7 @@
   </p:defaultTextStyle>
   <p:extLst>
     <p:ext uri="{EFAFB233-063F-42B5-8137-9DF3F51BA10A}">
-      <p15:sldGuideLst xmlns:p15="http://schemas.microsoft.com/office/powerpoint/2012/main" xmlns="">
+      <p15:sldGuideLst xmlns="" xmlns:p15="http://schemas.microsoft.com/office/powerpoint/2012/main">
         <p15:guide id="1" orient="horz" pos="2160">
           <p15:clr>
             <a:srgbClr val="A4A3A4"/>
@@ -13568,7 +13570,6 @@
               <a:rPr lang="en-US" sz="2800" noProof="1"/>
               <a:t>Từ điều kiện (ii) có suy ra được điều kiện (i) hay không?</a:t>
             </a:r>
-            <a:endParaRPr lang="en-US" sz="2800" noProof="1"/>
           </a:p>
         </p:txBody>
       </p:sp>
@@ -13812,11 +13813,7 @@
             <a:pPr eaLnBrk="1" hangingPunct="1"/>
             <a:r>
               <a:rPr lang="vi-VN" sz="3600" smtClean="0"/>
-              <a:t>Bài tập </a:t>
-            </a:r>
-            <a:r>
-              <a:rPr lang="vi-VN" sz="3600" smtClean="0"/>
-              <a:t>19.3</a:t>
+              <a:t>Bài tập 19.3</a:t>
             </a:r>
             <a:endParaRPr lang="vi-VN" sz="3600" dirty="0" smtClean="0"/>
           </a:p>
@@ -14240,6 +14237,266 @@
       </p:grpSpPr>
       <p:sp>
         <p:nvSpPr>
+          <p:cNvPr id="6146" name="Rectangle 2"/>
+          <p:cNvSpPr>
+            <a:spLocks noGrp="1" noChangeArrowheads="1"/>
+          </p:cNvSpPr>
+          <p:nvPr>
+            <p:ph type="title"/>
+          </p:nvPr>
+        </p:nvSpPr>
+        <p:spPr/>
+        <p:txBody>
+          <a:bodyPr/>
+          <a:lstStyle/>
+          <a:p>
+            <a:pPr eaLnBrk="1" hangingPunct="1"/>
+            <a:r>
+              <a:rPr lang="vi-VN" sz="3600" smtClean="0"/>
+              <a:t>Bài tập </a:t>
+            </a:r>
+            <a:r>
+              <a:rPr lang="vi-VN" sz="3600" smtClean="0"/>
+              <a:t>19.4</a:t>
+            </a:r>
+            <a:endParaRPr lang="vi-VN" sz="3600" dirty="0" smtClean="0"/>
+          </a:p>
+        </p:txBody>
+      </p:sp>
+      <p:sp>
+        <p:nvSpPr>
+          <p:cNvPr id="6147" name="Rectangle 3"/>
+          <p:cNvSpPr>
+            <a:spLocks noGrp="1" noChangeArrowheads="1"/>
+          </p:cNvSpPr>
+          <p:nvPr>
+            <p:ph type="body" idx="1"/>
+          </p:nvPr>
+        </p:nvSpPr>
+        <p:spPr>
+          <a:xfrm>
+            <a:off x="611560" y="2132856"/>
+            <a:ext cx="8343528" cy="3999656"/>
+          </a:xfrm>
+        </p:spPr>
+        <p:txBody>
+          <a:bodyPr/>
+          <a:lstStyle/>
+          <a:p>
+            <a:pPr marL="0" indent="0" algn="just" eaLnBrk="1" hangingPunct="1">
+              <a:buNone/>
+              <a:defRPr/>
+            </a:pPr>
+            <a:r>
+              <a:rPr lang="en-US" sz="2400" smtClean="0"/>
+              <a:t>Hãy lấy ví dụ một tập điểm và 3 trọng tâm ban đầu sao cho kết quả phân cụm 3-means hội tụ với cụm rỗng. (ii) Kết quả chia cụm với cụm rỗng có thể là kết quả tối ưu toàn cục theo RSS?</a:t>
+            </a:r>
+            <a:endParaRPr lang="en-US" sz="2400" dirty="0" smtClean="0"/>
+          </a:p>
+        </p:txBody>
+      </p:sp>
+      <p:sp>
+        <p:nvSpPr>
+          <p:cNvPr id="2" name="Slide Number Placeholder 1"/>
+          <p:cNvSpPr>
+            <a:spLocks noGrp="1"/>
+          </p:cNvSpPr>
+          <p:nvPr>
+            <p:ph type="sldNum" sz="quarter" idx="12"/>
+          </p:nvPr>
+        </p:nvSpPr>
+        <p:spPr/>
+        <p:txBody>
+          <a:bodyPr/>
+          <a:lstStyle/>
+          <a:p>
+            <a:pPr>
+              <a:defRPr/>
+            </a:pPr>
+            <a:fld id="{A81E07A1-38DA-436E-9EB2-1E501CB9FFA7}" type="slidenum">
+              <a:rPr lang="vi-VN" smtClean="0"/>
+              <a:pPr>
+                <a:defRPr/>
+              </a:pPr>
+              <a:t>20</a:t>
+            </a:fld>
+            <a:endParaRPr lang="vi-VN"/>
+          </a:p>
+        </p:txBody>
+      </p:sp>
+    </p:spTree>
+    <p:extLst>
+      <p:ext uri="{BB962C8B-B14F-4D97-AF65-F5344CB8AC3E}">
+        <p14:creationId xmlns:p14="http://schemas.microsoft.com/office/powerpoint/2010/main" val="1942487173"/>
+      </p:ext>
+    </p:extLst>
+  </p:cSld>
+  <p:clrMapOvr>
+    <a:masterClrMapping/>
+  </p:clrMapOvr>
+  <p:timing>
+    <p:tnLst>
+      <p:par>
+        <p:cTn id="1" dur="indefinite" restart="never" nodeType="tmRoot"/>
+      </p:par>
+    </p:tnLst>
+  </p:timing>
+</p:sld>
+</file>
+
+<file path=ppt/slides/slide21.xml><?xml version="1.0" encoding="utf-8"?>
+<p:sld xmlns:a="http://schemas.openxmlformats.org/drawingml/2006/main" xmlns:r="http://schemas.openxmlformats.org/officeDocument/2006/relationships" xmlns:p="http://schemas.openxmlformats.org/presentationml/2006/main">
+  <p:cSld>
+    <p:spTree>
+      <p:nvGrpSpPr>
+        <p:cNvPr id="1" name=""/>
+        <p:cNvGrpSpPr/>
+        <p:nvPr/>
+      </p:nvGrpSpPr>
+      <p:grpSpPr>
+        <a:xfrm>
+          <a:off x="0" y="0"/>
+          <a:ext cx="0" cy="0"/>
+          <a:chOff x="0" y="0"/>
+          <a:chExt cx="0" cy="0"/>
+        </a:xfrm>
+      </p:grpSpPr>
+      <p:sp>
+        <p:nvSpPr>
+          <p:cNvPr id="6146" name="Rectangle 2"/>
+          <p:cNvSpPr>
+            <a:spLocks noGrp="1" noChangeArrowheads="1"/>
+          </p:cNvSpPr>
+          <p:nvPr>
+            <p:ph type="title"/>
+          </p:nvPr>
+        </p:nvSpPr>
+        <p:spPr/>
+        <p:txBody>
+          <a:bodyPr/>
+          <a:lstStyle/>
+          <a:p>
+            <a:pPr eaLnBrk="1" hangingPunct="1"/>
+            <a:r>
+              <a:rPr lang="vi-VN" sz="3600" smtClean="0"/>
+              <a:t>Bài tập </a:t>
+            </a:r>
+            <a:r>
+              <a:rPr lang="vi-VN" sz="3600" smtClean="0"/>
+              <a:t>19.6</a:t>
+            </a:r>
+            <a:endParaRPr lang="vi-VN" sz="3600" dirty="0" smtClean="0"/>
+          </a:p>
+        </p:txBody>
+      </p:sp>
+      <p:sp>
+        <p:nvSpPr>
+          <p:cNvPr id="6147" name="Rectangle 3"/>
+          <p:cNvSpPr>
+            <a:spLocks noGrp="1" noChangeArrowheads="1"/>
+          </p:cNvSpPr>
+          <p:nvPr>
+            <p:ph type="body" idx="1"/>
+          </p:nvPr>
+        </p:nvSpPr>
+        <p:spPr>
+          <a:xfrm>
+            <a:off x="611560" y="2132856"/>
+            <a:ext cx="8343528" cy="3999656"/>
+          </a:xfrm>
+        </p:spPr>
+        <p:txBody>
+          <a:bodyPr/>
+          <a:lstStyle/>
+          <a:p>
+            <a:pPr marL="0" indent="0" algn="just" eaLnBrk="1" hangingPunct="1">
+              <a:buNone/>
+              <a:defRPr/>
+            </a:pPr>
+            <a:r>
+              <a:rPr lang="en-US" sz="2400" smtClean="0"/>
+              <a:t>Hãy chứng minh RSS</a:t>
+            </a:r>
+            <a:r>
+              <a:rPr lang="en-US" sz="2400" baseline="-25000" smtClean="0"/>
+              <a:t>min</a:t>
+            </a:r>
+            <a:r>
+              <a:rPr lang="en-US" sz="2400" smtClean="0"/>
+              <a:t>(K) là hàm đơn điệu giảm đối với biến K.</a:t>
+            </a:r>
+            <a:endParaRPr lang="en-US" sz="2400" dirty="0" smtClean="0"/>
+          </a:p>
+        </p:txBody>
+      </p:sp>
+      <p:sp>
+        <p:nvSpPr>
+          <p:cNvPr id="2" name="Slide Number Placeholder 1"/>
+          <p:cNvSpPr>
+            <a:spLocks noGrp="1"/>
+          </p:cNvSpPr>
+          <p:nvPr>
+            <p:ph type="sldNum" sz="quarter" idx="12"/>
+          </p:nvPr>
+        </p:nvSpPr>
+        <p:spPr/>
+        <p:txBody>
+          <a:bodyPr/>
+          <a:lstStyle/>
+          <a:p>
+            <a:pPr>
+              <a:defRPr/>
+            </a:pPr>
+            <a:fld id="{A81E07A1-38DA-436E-9EB2-1E501CB9FFA7}" type="slidenum">
+              <a:rPr lang="vi-VN" smtClean="0"/>
+              <a:pPr>
+                <a:defRPr/>
+              </a:pPr>
+              <a:t>21</a:t>
+            </a:fld>
+            <a:endParaRPr lang="vi-VN"/>
+          </a:p>
+        </p:txBody>
+      </p:sp>
+    </p:spTree>
+    <p:extLst>
+      <p:ext uri="{BB962C8B-B14F-4D97-AF65-F5344CB8AC3E}">
+        <p14:creationId xmlns:p14="http://schemas.microsoft.com/office/powerpoint/2010/main" val="3167741854"/>
+      </p:ext>
+    </p:extLst>
+  </p:cSld>
+  <p:clrMapOvr>
+    <a:masterClrMapping/>
+  </p:clrMapOvr>
+  <p:timing>
+    <p:tnLst>
+      <p:par>
+        <p:cTn id="1" dur="indefinite" restart="never" nodeType="tmRoot"/>
+      </p:par>
+    </p:tnLst>
+  </p:timing>
+</p:sld>
+</file>
+
+<file path=ppt/slides/slide22.xml><?xml version="1.0" encoding="utf-8"?>
+<p:sld xmlns:a="http://schemas.openxmlformats.org/drawingml/2006/main" xmlns:r="http://schemas.openxmlformats.org/officeDocument/2006/relationships" xmlns:p="http://schemas.openxmlformats.org/presentationml/2006/main">
+  <p:cSld>
+    <p:spTree>
+      <p:nvGrpSpPr>
+        <p:cNvPr id="1" name=""/>
+        <p:cNvGrpSpPr/>
+        <p:nvPr/>
+      </p:nvGrpSpPr>
+      <p:grpSpPr>
+        <a:xfrm>
+          <a:off x="0" y="0"/>
+          <a:ext cx="0" cy="0"/>
+          <a:chOff x="0" y="0"/>
+          <a:chExt cx="0" cy="0"/>
+        </a:xfrm>
+      </p:grpSpPr>
+      <p:sp>
+        <p:nvSpPr>
           <p:cNvPr id="18434" name="Rectangle 2"/>
           <p:cNvSpPr>
             <a:spLocks noGrp="1" noChangeArrowheads="1"/>
@@ -14335,7 +14592,7 @@
               <a:pPr>
                 <a:defRPr/>
               </a:pPr>
-              <a:t>20</a:t>
+              <a:t>22</a:t>
             </a:fld>
             <a:endParaRPr lang="vi-VN"/>
           </a:p>
@@ -17364,7 +17621,7 @@
   </a:extraClrSchemeLst>
   <a:extLst>
     <a:ext uri="{05A4C25C-085E-4340-85A3-A5531E510DB2}">
-      <thm15:themeFamily xmlns:thm15="http://schemas.microsoft.com/office/thememl/2012/main" xmlns="" name="Office Theme" id="{62F939B6-93AF-4DB8-9C6B-D6C7DFDC589F}" vid="{4A3C46E8-61CC-4603-A589-7422A47A8E4A}"/>
+      <thm15:themeFamily xmlns="" xmlns:thm15="http://schemas.microsoft.com/office/thememl/2012/main" name="Office Theme" id="{62F939B6-93AF-4DB8-9C6B-D6C7DFDC589F}" vid="{4A3C46E8-61CC-4603-A589-7422A47A8E4A}"/>
     </a:ext>
   </a:extLst>
 </a:theme>
@@ -17625,7 +17882,7 @@
   <a:extraClrSchemeLst/>
   <a:extLst>
     <a:ext uri="{05A4C25C-085E-4340-85A3-A5531E510DB2}">
-      <thm15:themeFamily xmlns:thm15="http://schemas.microsoft.com/office/thememl/2012/main" xmlns="" name="Office Theme" id="{62F939B6-93AF-4DB8-9C6B-D6C7DFDC589F}" vid="{4A3C46E8-61CC-4603-A589-7422A47A8E4A}"/>
+      <thm15:themeFamily xmlns="" xmlns:thm15="http://schemas.microsoft.com/office/thememl/2012/main" name="Office Theme" id="{62F939B6-93AF-4DB8-9C6B-D6C7DFDC589F}" vid="{4A3C46E8-61CC-4603-A589-7422A47A8E4A}"/>
     </a:ext>
   </a:extLst>
 </a:theme>

</xml_diff>

<commit_message>
Thu tu bao ve thu 2 12/12
</commit_message>
<xml_diff>
--- a/Bai 19 Chia cum van ban_p2.pptx
+++ b/Bai 19 Chia cum van ban_p2.pptx
@@ -160,7 +160,7 @@
   </p:defaultTextStyle>
   <p:extLst>
     <p:ext uri="{EFAFB233-063F-42B5-8137-9DF3F51BA10A}">
-      <p15:sldGuideLst xmlns="" xmlns:p15="http://schemas.microsoft.com/office/powerpoint/2012/main">
+      <p15:sldGuideLst xmlns:p15="http://schemas.microsoft.com/office/powerpoint/2012/main" xmlns="">
         <p15:guide id="1" orient="horz" pos="2160">
           <p15:clr>
             <a:srgbClr val="A4A3A4"/>
@@ -14257,7 +14257,11 @@
             </a:r>
             <a:r>
               <a:rPr lang="vi-VN" sz="3600" smtClean="0"/>
-              <a:t>19.4</a:t>
+              <a:t>19.</a:t>
+            </a:r>
+            <a:r>
+              <a:rPr lang="en-US" sz="3600" smtClean="0"/>
+              <a:t>5</a:t>
             </a:r>
             <a:endParaRPr lang="vi-VN" sz="3600" dirty="0" smtClean="0"/>
           </a:p>
@@ -14379,11 +14383,7 @@
             <a:pPr eaLnBrk="1" hangingPunct="1"/>
             <a:r>
               <a:rPr lang="vi-VN" sz="3600" smtClean="0"/>
-              <a:t>Bài tập </a:t>
-            </a:r>
-            <a:r>
-              <a:rPr lang="vi-VN" sz="3600" smtClean="0"/>
-              <a:t>19.6</a:t>
+              <a:t>Bài tập 19.6</a:t>
             </a:r>
             <a:endParaRPr lang="vi-VN" sz="3600" dirty="0" smtClean="0"/>
           </a:p>
@@ -17621,7 +17621,7 @@
   </a:extraClrSchemeLst>
   <a:extLst>
     <a:ext uri="{05A4C25C-085E-4340-85A3-A5531E510DB2}">
-      <thm15:themeFamily xmlns="" xmlns:thm15="http://schemas.microsoft.com/office/thememl/2012/main" name="Office Theme" id="{62F939B6-93AF-4DB8-9C6B-D6C7DFDC589F}" vid="{4A3C46E8-61CC-4603-A589-7422A47A8E4A}"/>
+      <thm15:themeFamily xmlns:thm15="http://schemas.microsoft.com/office/thememl/2012/main" xmlns="" name="Office Theme" id="{62F939B6-93AF-4DB8-9C6B-D6C7DFDC589F}" vid="{4A3C46E8-61CC-4603-A589-7422A47A8E4A}"/>
     </a:ext>
   </a:extLst>
 </a:theme>
@@ -17882,7 +17882,7 @@
   <a:extraClrSchemeLst/>
   <a:extLst>
     <a:ext uri="{05A4C25C-085E-4340-85A3-A5531E510DB2}">
-      <thm15:themeFamily xmlns="" xmlns:thm15="http://schemas.microsoft.com/office/thememl/2012/main" name="Office Theme" id="{62F939B6-93AF-4DB8-9C6B-D6C7DFDC589F}" vid="{4A3C46E8-61CC-4603-A589-7422A47A8E4A}"/>
+      <thm15:themeFamily xmlns:thm15="http://schemas.microsoft.com/office/thememl/2012/main" xmlns="" name="Office Theme" id="{62F939B6-93AF-4DB8-9C6B-D6C7DFDC589F}" vid="{4A3C46E8-61CC-4603-A589-7422A47A8E4A}"/>
     </a:ext>
   </a:extLst>
 </a:theme>

</xml_diff>